<commit_message>
RELEASE!!! + background fix
</commit_message>
<xml_diff>
--- a/data/Презентация.pptx
+++ b/data/Презентация.pptx
@@ -7,9 +7,10 @@
   <p:sldIdLst>
     <p:sldId id="256" r:id="rId2"/>
     <p:sldId id="257" r:id="rId3"/>
-    <p:sldId id="258" r:id="rId4"/>
-    <p:sldId id="259" r:id="rId5"/>
-    <p:sldId id="260" r:id="rId6"/>
+    <p:sldId id="261" r:id="rId4"/>
+    <p:sldId id="258" r:id="rId5"/>
+    <p:sldId id="259" r:id="rId6"/>
+    <p:sldId id="260" r:id="rId7"/>
   </p:sldIdLst>
   <p:sldSz cx="9144000" cy="6858000" type="screen4x3"/>
   <p:notesSz cx="6858000" cy="9144000"/>
@@ -293,7 +294,7 @@
             <a:fld id="{5B106E36-FD25-4E2D-B0AA-010F637433A0}" type="datetimeFigureOut">
               <a:rPr lang="ru-RU" smtClean="0"/>
               <a:pPr/>
-              <a:t>17.01.2022</a:t>
+              <a:t>18.01.2022</a:t>
             </a:fld>
             <a:endParaRPr lang="ru-RU"/>
           </a:p>
@@ -460,7 +461,7 @@
             <a:fld id="{5B106E36-FD25-4E2D-B0AA-010F637433A0}" type="datetimeFigureOut">
               <a:rPr lang="ru-RU" smtClean="0"/>
               <a:pPr/>
-              <a:t>17.01.2022</a:t>
+              <a:t>18.01.2022</a:t>
             </a:fld>
             <a:endParaRPr lang="ru-RU"/>
           </a:p>
@@ -637,7 +638,7 @@
             <a:fld id="{5B106E36-FD25-4E2D-B0AA-010F637433A0}" type="datetimeFigureOut">
               <a:rPr lang="ru-RU" smtClean="0"/>
               <a:pPr/>
-              <a:t>17.01.2022</a:t>
+              <a:t>18.01.2022</a:t>
             </a:fld>
             <a:endParaRPr lang="ru-RU"/>
           </a:p>
@@ -804,7 +805,7 @@
             <a:fld id="{5B106E36-FD25-4E2D-B0AA-010F637433A0}" type="datetimeFigureOut">
               <a:rPr lang="ru-RU" smtClean="0"/>
               <a:pPr/>
-              <a:t>17.01.2022</a:t>
+              <a:t>18.01.2022</a:t>
             </a:fld>
             <a:endParaRPr lang="ru-RU"/>
           </a:p>
@@ -1047,7 +1048,7 @@
             <a:fld id="{5B106E36-FD25-4E2D-B0AA-010F637433A0}" type="datetimeFigureOut">
               <a:rPr lang="ru-RU" smtClean="0"/>
               <a:pPr/>
-              <a:t>17.01.2022</a:t>
+              <a:t>18.01.2022</a:t>
             </a:fld>
             <a:endParaRPr lang="ru-RU"/>
           </a:p>
@@ -1332,7 +1333,7 @@
             <a:fld id="{5B106E36-FD25-4E2D-B0AA-010F637433A0}" type="datetimeFigureOut">
               <a:rPr lang="ru-RU" smtClean="0"/>
               <a:pPr/>
-              <a:t>17.01.2022</a:t>
+              <a:t>18.01.2022</a:t>
             </a:fld>
             <a:endParaRPr lang="ru-RU"/>
           </a:p>
@@ -1751,7 +1752,7 @@
             <a:fld id="{5B106E36-FD25-4E2D-B0AA-010F637433A0}" type="datetimeFigureOut">
               <a:rPr lang="ru-RU" smtClean="0"/>
               <a:pPr/>
-              <a:t>17.01.2022</a:t>
+              <a:t>18.01.2022</a:t>
             </a:fld>
             <a:endParaRPr lang="ru-RU"/>
           </a:p>
@@ -1866,7 +1867,7 @@
             <a:fld id="{5B106E36-FD25-4E2D-B0AA-010F637433A0}" type="datetimeFigureOut">
               <a:rPr lang="ru-RU" smtClean="0"/>
               <a:pPr/>
-              <a:t>17.01.2022</a:t>
+              <a:t>18.01.2022</a:t>
             </a:fld>
             <a:endParaRPr lang="ru-RU"/>
           </a:p>
@@ -1958,7 +1959,7 @@
             <a:fld id="{5B106E36-FD25-4E2D-B0AA-010F637433A0}" type="datetimeFigureOut">
               <a:rPr lang="ru-RU" smtClean="0"/>
               <a:pPr/>
-              <a:t>17.01.2022</a:t>
+              <a:t>18.01.2022</a:t>
             </a:fld>
             <a:endParaRPr lang="ru-RU"/>
           </a:p>
@@ -2232,7 +2233,7 @@
             <a:fld id="{5B106E36-FD25-4E2D-B0AA-010F637433A0}" type="datetimeFigureOut">
               <a:rPr lang="ru-RU" smtClean="0"/>
               <a:pPr/>
-              <a:t>17.01.2022</a:t>
+              <a:t>18.01.2022</a:t>
             </a:fld>
             <a:endParaRPr lang="ru-RU"/>
           </a:p>
@@ -2482,7 +2483,7 @@
             <a:fld id="{5B106E36-FD25-4E2D-B0AA-010F637433A0}" type="datetimeFigureOut">
               <a:rPr lang="ru-RU" smtClean="0"/>
               <a:pPr/>
-              <a:t>17.01.2022</a:t>
+              <a:t>18.01.2022</a:t>
             </a:fld>
             <a:endParaRPr lang="ru-RU"/>
           </a:p>
@@ -2692,7 +2693,7 @@
             <a:fld id="{5B106E36-FD25-4E2D-B0AA-010F637433A0}" type="datetimeFigureOut">
               <a:rPr lang="ru-RU" smtClean="0"/>
               <a:pPr/>
-              <a:t>17.01.2022</a:t>
+              <a:t>18.01.2022</a:t>
             </a:fld>
             <a:endParaRPr lang="ru-RU"/>
           </a:p>
@@ -3583,6 +3584,94 @@
           <a:p>
             <a:r>
               <a:rPr lang="ru-RU" dirty="0" smtClean="0"/>
+              <a:t>Структура кода</a:t>
+            </a:r>
+            <a:endParaRPr lang="ru-RU" dirty="0"/>
+          </a:p>
+        </p:txBody>
+      </p:sp>
+      <p:sp>
+        <p:nvSpPr>
+          <p:cNvPr id="3" name="Содержимое 2"/>
+          <p:cNvSpPr>
+            <a:spLocks noGrp="1"/>
+          </p:cNvSpPr>
+          <p:nvPr>
+            <p:ph idx="1"/>
+          </p:nvPr>
+        </p:nvSpPr>
+        <p:spPr/>
+        <p:txBody>
+          <a:bodyPr/>
+          <a:lstStyle/>
+          <a:p>
+            <a:r>
+              <a:rPr lang="ru-RU" dirty="0" smtClean="0"/>
+              <a:t>Основной файл </a:t>
+            </a:r>
+            <a:r>
+              <a:rPr lang="en-US" dirty="0" smtClean="0"/>
+              <a:t>main.py</a:t>
+            </a:r>
+            <a:endParaRPr lang="ru-RU" dirty="0" smtClean="0"/>
+          </a:p>
+          <a:p>
+            <a:r>
+              <a:rPr lang="ru-RU" dirty="0" smtClean="0"/>
+              <a:t>Каждый объект на экране – экземпляр класса</a:t>
+            </a:r>
+          </a:p>
+          <a:p>
+            <a:r>
+              <a:rPr lang="ru-RU" dirty="0" smtClean="0"/>
+              <a:t>Функции для компиляции и запуска уровня</a:t>
+            </a:r>
+            <a:endParaRPr lang="ru-RU" dirty="0"/>
+          </a:p>
+        </p:txBody>
+      </p:sp>
+    </p:spTree>
+  </p:cSld>
+  <p:clrMapOvr>
+    <a:masterClrMapping/>
+  </p:clrMapOvr>
+</p:sld>
+</file>
+
+<file path=ppt/slides/slide4.xml><?xml version="1.0" encoding="utf-8"?>
+<p:sld xmlns:a="http://schemas.openxmlformats.org/drawingml/2006/main" xmlns:r="http://schemas.openxmlformats.org/officeDocument/2006/relationships" xmlns:p="http://schemas.openxmlformats.org/presentationml/2006/main">
+  <p:cSld>
+    <p:spTree>
+      <p:nvGrpSpPr>
+        <p:cNvPr id="1" name=""/>
+        <p:cNvGrpSpPr/>
+        <p:nvPr/>
+      </p:nvGrpSpPr>
+      <p:grpSpPr>
+        <a:xfrm>
+          <a:off x="0" y="0"/>
+          <a:ext cx="0" cy="0"/>
+          <a:chOff x="0" y="0"/>
+          <a:chExt cx="0" cy="0"/>
+        </a:xfrm>
+      </p:grpSpPr>
+      <p:sp>
+        <p:nvSpPr>
+          <p:cNvPr id="2" name="Заголовок 1"/>
+          <p:cNvSpPr>
+            <a:spLocks noGrp="1"/>
+          </p:cNvSpPr>
+          <p:nvPr>
+            <p:ph type="title"/>
+          </p:nvPr>
+        </p:nvSpPr>
+        <p:spPr/>
+        <p:txBody>
+          <a:bodyPr/>
+          <a:lstStyle/>
+          <a:p>
+            <a:r>
+              <a:rPr lang="ru-RU" dirty="0" smtClean="0"/>
               <a:t>Реализация</a:t>
             </a:r>
             <a:endParaRPr lang="ru-RU" dirty="0"/>
@@ -3810,7 +3899,7 @@
 </p:sld>
 </file>
 
-<file path=ppt/slides/slide4.xml><?xml version="1.0" encoding="utf-8"?>
+<file path=ppt/slides/slide5.xml><?xml version="1.0" encoding="utf-8"?>
 <p:sld xmlns:a="http://schemas.openxmlformats.org/drawingml/2006/main" xmlns:r="http://schemas.openxmlformats.org/officeDocument/2006/relationships" xmlns:p="http://schemas.openxmlformats.org/presentationml/2006/main">
   <p:cSld>
     <p:spTree>
@@ -3869,7 +3958,7 @@
 </p:sld>
 </file>
 
-<file path=ppt/slides/slide5.xml><?xml version="1.0" encoding="utf-8"?>
+<file path=ppt/slides/slide6.xml><?xml version="1.0" encoding="utf-8"?>
 <p:sld xmlns:a="http://schemas.openxmlformats.org/drawingml/2006/main" xmlns:r="http://schemas.openxmlformats.org/officeDocument/2006/relationships" xmlns:p="http://schemas.openxmlformats.org/presentationml/2006/main">
   <p:cSld>
     <p:spTree>

</xml_diff>